<commit_message>
Update pros and cons
</commit_message>
<xml_diff>
--- a/Why Matlab.pptx
+++ b/Why Matlab.pptx
@@ -3343,6 +3343,12 @@
             </a:r>
           </a:p>
           <a:p>
+            <a:pPr marL="0" indent="0">
+              <a:buNone/>
+            </a:pPr>
+            <a:endParaRPr lang="en-US" dirty="0" smtClean="0"/>
+          </a:p>
+          <a:p>
             <a:endParaRPr lang="en-US" dirty="0" smtClean="0"/>
           </a:p>
           <a:p>
@@ -3422,7 +3428,9 @@
         </p:nvSpPr>
         <p:spPr/>
         <p:txBody>
-          <a:bodyPr/>
+          <a:bodyPr>
+            <a:normAutofit fontScale="92500" lnSpcReduction="10000"/>
+          </a:bodyPr>
           <a:lstStyle/>
           <a:p>
             <a:r>
@@ -3433,7 +3441,15 @@
           <a:p>
             <a:r>
               <a:rPr lang="en-US" dirty="0" smtClean="0"/>
-              <a:t>Takes care of low level things</a:t>
+              <a:t>Takes care of low level things (memory </a:t>
+            </a:r>
+            <a:r>
+              <a:rPr lang="en-US" dirty="0" err="1" smtClean="0"/>
+              <a:t>managaement</a:t>
+            </a:r>
+            <a:r>
+              <a:rPr lang="en-US" dirty="0" smtClean="0"/>
+              <a:t>, lots of pre-built functions)</a:t>
             </a:r>
           </a:p>
           <a:p>
@@ -3451,13 +3467,13 @@
           <a:p>
             <a:r>
               <a:rPr lang="en-US" dirty="0" smtClean="0"/>
-              <a:t>Many toolboxes for added functionality (signal processing, etc.)</a:t>
+              <a:t>Many toolboxes for added functionality (signal processing, image processing, etc.)</a:t>
             </a:r>
           </a:p>
           <a:p>
             <a:r>
               <a:rPr lang="en-US" dirty="0" smtClean="0"/>
-              <a:t>Fast prototyping</a:t>
+              <a:t>Fast prototyping – easy to test new ideas</a:t>
             </a:r>
             <a:endParaRPr lang="en-US" dirty="0"/>
           </a:p>
@@ -3550,6 +3566,10 @@
             </a:r>
           </a:p>
           <a:p>
+            <a:r>
+              <a:rPr lang="en-US" dirty="0" smtClean="0"/>
+              <a:t>Can be slow (C++ and Fortran are faster)</a:t>
+            </a:r>
             <a:endParaRPr lang="en-US" dirty="0"/>
           </a:p>
         </p:txBody>

</xml_diff>